<commit_message>
Added comments and formatting
</commit_message>
<xml_diff>
--- a/sample.pptx
+++ b/sample.pptx
@@ -7,7 +7,7 @@
   <p:sldIdLst>
     <p:sldId id="256" r:id="rId3"/>
   </p:sldIdLst>
-  <p:sldSz cx="9144000" cy="6858000" type="screen4x3"/>
+  <p:sldSz cx="9144000" cy="5143500" type="screen16x9"/>
   <p:notesSz cx="6858000" cy="9144000"/>
   <p:defaultTextStyle>
     <a:defPPr>
@@ -161,7 +161,7 @@
   </p:cSld>
   <p:clrMap bg1="lt1" tx1="dk1" bg2="lt2" tx2="dk2" accent1="accent1" accent2="accent2" accent3="accent3" accent4="accent4" accent5="accent5" accent6="accent6" hlink="hlink" folHlink="folHlink"/>
   <p:sldLayoutIdLst>
-    <p:sldLayoutId id="2426581786" r:id="rId1"/>
+    <p:sldLayoutId id="2426590474" r:id="rId1"/>
   </p:sldLayoutIdLst>
   <p:txStyles>
     <p:titleStyle>
@@ -201,6 +201,16 @@
 <file path=ppt/slides/slide1.xml><?xml version="1.0" encoding="utf-8"?>
 <p:sld xmlns:a="http://schemas.openxmlformats.org/drawingml/2006/main" xmlns:r="http://schemas.openxmlformats.org/officeDocument/2006/relationships" xmlns:p="http://schemas.openxmlformats.org/presentationml/2006/main">
   <p:cSld>
+    <p:bg>
+      <p:bgPr>
+        <a:blipFill>
+          <a:blip r:embed="rId3"/>
+          <a:stretch>
+            <a:fillRect/>
+          </a:stretch>
+        </a:blipFill>
+      </p:bgPr>
+    </p:bg>
     <p:spTree>
       <p:nvGrpSpPr>
         <p:cNvPr id="1" name=""/>
@@ -209,15 +219,15 @@
       </p:nvGrpSpPr>
       <p:grpSpPr>
         <a:xfrm>
-          <a:off x="95250" y="95250"/>
-          <a:ext cx="7334250" cy="4572000"/>
-          <a:chOff x="95250" y="95250"/>
-          <a:chExt cx="7334250" cy="4572000"/>
+          <a:off x="0" y="476250"/>
+          <a:ext cx="9144000" cy="3810000"/>
+          <a:chOff x="0" y="476250"/>
+          <a:chExt cx="9144000" cy="3810000"/>
         </a:xfrm>
       </p:grpSpPr>
       <p:pic>
         <p:nvPicPr>
-          <p:cNvPr id="2" name="PHPPresentation logo" descr="PHPPresentation logo"/>
+          <p:cNvPr id="2" name="CodeAdam Logo" descr=""/>
           <p:cNvPicPr>
             <a:picLocks noChangeAspect="1"/>
           </p:cNvPicPr>
@@ -231,20 +241,13 @@
         </p:blipFill>
         <p:spPr>
           <a:xfrm>
-            <a:off x="95250" y="95250"/>
-            <a:ext cx="257175" cy="342900"/>
+            <a:off x="4095750" y="476250"/>
+            <a:ext cx="952500" cy="952500"/>
           </a:xfrm>
           <a:prstGeom prst="rect">
             <a:avLst/>
           </a:prstGeom>
           <a:noFill/>
-          <a:effectLst>
-            <a:outerShdw blurRad="57150" dist="95250" dir="2700000" algn="br" rotWithShape="0">
-              <a:srgbClr val="000000">
-                <a:alpha val="50000"/>
-              </a:srgbClr>
-            </a:outerShdw>
-          </a:effectLst>
         </p:spPr>
       </p:pic>
       <p:sp>
@@ -255,8 +258,8 @@
         </p:nvSpPr>
         <p:spPr>
           <a:xfrm>
-            <a:off x="1619250" y="1714500"/>
-            <a:ext cx="5715000" cy="2857500"/>
+            <a:off x="0" y="1714500"/>
+            <a:ext cx="9144000" cy="476250"/>
           </a:xfrm>
           <a:prstGeom prst="rect">
             <a:avLst/>
@@ -281,15 +284,156 @@
               </a:spcAft>
             </a:pPr>
             <a:r>
-              <a:rPr lang="en-US" b="1" strike="noStrike" sz="6000" spc="0" u="none" cap="none">
+              <a:rPr lang="en-US" strike="noStrike" sz="3000" spc="0" u="none" cap="none">
                 <a:solidFill>
-                  <a:srgbClr val="E06B20">
+                  <a:srgbClr val="FFFFFF">
                     <a:alpha val="100000"/>
                   </a:srgbClr>
                 </a:solidFill>
-                <a:latin typeface="Calibri"/>
+                <a:latin typeface="Helvetica"/>
               </a:rPr>
-              <a:t><![CDATA[Thank you for using PHPPresentation!]]></a:t>
+              <a:t><![CDATA[Adam Thomas]]></a:t>
+            </a:r>
+          </a:p>
+        </p:txBody>
+      </p:sp>
+      <p:sp>
+        <p:nvSpPr>
+          <p:cNvPr id="4" name=""/>
+          <p:cNvSpPr txBox="1"/>
+          <p:nvPr/>
+        </p:nvSpPr>
+        <p:spPr>
+          <a:xfrm>
+            <a:off x="0" y="2286000"/>
+            <a:ext cx="9144000" cy="571500"/>
+          </a:xfrm>
+          <a:prstGeom prst="rect">
+            <a:avLst/>
+          </a:prstGeom>
+          <a:noFill/>
+        </p:spPr>
+        <p:txBody>
+          <a:bodyPr anchorCtr="0" rtlCol="0" vert="horz" bIns="45720" lIns="91440" rIns="91440" tIns="45720">
+            <a:spAutoFit/>
+          </a:bodyPr>
+          <a:lstStyle/>
+          <a:p>
+            <a:pPr algn="ctr" rtl="0" fontAlgn="base" marL="0" marR="0" indent="0" lvl="0">
+              <a:lnSpc>
+                <a:spcPct val="100000"/>
+              </a:lnSpc>
+              <a:spcBef>
+                <a:spcPts val="0"/>
+              </a:spcBef>
+              <a:spcAft>
+                <a:spcPts val="0"/>
+              </a:spcAft>
+            </a:pPr>
+            <a:r>
+              <a:rPr lang="en-US" strike="noStrike" sz="4000" spc="0" u="none" cap="none">
+                <a:solidFill>
+                  <a:srgbClr val="FF0000">
+                    <a:alpha val="100000"/>
+                  </a:srgbClr>
+                </a:solidFill>
+                <a:latin typeface="Helvetica"/>
+              </a:rPr>
+              <a:t><![CDATA[I Teach Code!]]></a:t>
+            </a:r>
+          </a:p>
+        </p:txBody>
+      </p:sp>
+      <p:sp>
+        <p:nvSpPr>
+          <p:cNvPr id="5" name=""/>
+          <p:cNvSpPr txBox="1"/>
+          <p:nvPr/>
+        </p:nvSpPr>
+        <p:spPr>
+          <a:xfrm>
+            <a:off x="0" y="2952750"/>
+            <a:ext cx="9144000" cy="381000"/>
+          </a:xfrm>
+          <a:prstGeom prst="rect">
+            <a:avLst/>
+          </a:prstGeom>
+          <a:noFill/>
+        </p:spPr>
+        <p:txBody>
+          <a:bodyPr anchorCtr="0" rtlCol="0" vert="horz" bIns="45720" lIns="91440" rIns="91440" tIns="45720">
+            <a:spAutoFit/>
+          </a:bodyPr>
+          <a:lstStyle/>
+          <a:p>
+            <a:pPr algn="ctr" rtl="0" fontAlgn="base" marL="0" marR="0" indent="0" lvl="0">
+              <a:lnSpc>
+                <a:spcPct val="100000"/>
+              </a:lnSpc>
+              <a:spcBef>
+                <a:spcPts val="0"/>
+              </a:spcBef>
+              <a:spcAft>
+                <a:spcPts val="0"/>
+              </a:spcAft>
+            </a:pPr>
+            <a:r>
+              <a:rPr lang="en-US" strike="noStrike" sz="2000" spc="0" u="none" cap="none">
+                <a:solidFill>
+                  <a:srgbClr val="FFFFFF">
+                    <a:alpha val="100000"/>
+                  </a:srgbClr>
+                </a:solidFill>
+                <a:latin typeface="Helvetica"/>
+              </a:rPr>
+              <a:t><![CDATA[Self-taught full-stack developer.]]></a:t>
+            </a:r>
+          </a:p>
+        </p:txBody>
+      </p:sp>
+      <p:sp>
+        <p:nvSpPr>
+          <p:cNvPr id="6" name=""/>
+          <p:cNvSpPr txBox="1"/>
+          <p:nvPr/>
+        </p:nvSpPr>
+        <p:spPr>
+          <a:xfrm>
+            <a:off x="0" y="3429000"/>
+            <a:ext cx="9144000" cy="381000"/>
+          </a:xfrm>
+          <a:prstGeom prst="rect">
+            <a:avLst/>
+          </a:prstGeom>
+          <a:noFill/>
+        </p:spPr>
+        <p:txBody>
+          <a:bodyPr anchorCtr="0" rtlCol="0" vert="horz" bIns="45720" lIns="91440" rIns="91440" tIns="45720">
+            <a:spAutoFit/>
+          </a:bodyPr>
+          <a:lstStyle/>
+          <a:p>
+            <a:pPr algn="ctr" rtl="0" fontAlgn="base" marL="0" marR="0" indent="0" lvl="0">
+              <a:lnSpc>
+                <a:spcPct val="100000"/>
+              </a:lnSpc>
+              <a:spcBef>
+                <a:spcPts val="0"/>
+              </a:spcBef>
+              <a:spcAft>
+                <a:spcPts val="0"/>
+              </a:spcAft>
+            </a:pPr>
+            <a:r>
+              <a:rPr lang="en-US" strike="noStrike" sz="2000" spc="0" u="none" cap="none">
+                <a:solidFill>
+                  <a:srgbClr val="FFFFFF">
+                    <a:alpha val="100000"/>
+                  </a:srgbClr>
+                </a:solidFill>
+                <a:latin typeface="Helvetica"/>
+              </a:rPr>
+              <a:t><![CDATA[Learning code and teaching code at Humber Polytechnic, Toronto, Canada.]]></a:t>
             </a:r>
           </a:p>
         </p:txBody>
@@ -303,9 +447,9 @@
 </file>
 
 <file path=ppt/theme/theme1.xml><?xml version="1.0" encoding="utf-8"?>
-<a:theme xmlns:a="http://schemas.openxmlformats.org/drawingml/2006/main" name="Theme22">
+<a:theme xmlns:a="http://schemas.openxmlformats.org/drawingml/2006/main" name="Theme4">
   <a:themeElements>
-    <a:clrScheme name="Theme22">
+    <a:clrScheme name="Theme4">
       <a:dk1>
         <a:sysClr val="windowText" lastClr="000000"/>
       </a:dk1>
@@ -343,7 +487,7 @@
         <a:srgbClr val="800080"/>
       </a:folHlink>
     </a:clrScheme>
-    <a:fontScheme name="Theme22">
+    <a:fontScheme name="Theme4">
       <a:majorFont>
         <a:latin typeface="Calibri"/>
         <a:ea typeface=""/>
@@ -413,7 +557,7 @@
         <a:font script="Uigh" typeface="Microsoft Uighur"/>
       </a:minorFont>
     </a:fontScheme>
-    <a:fmtScheme name="Theme22">
+    <a:fmtScheme name="Theme4">
       <a:fillStyleLst>
         <a:solidFill>
           <a:schemeClr val="phClr"/>

</xml_diff>